<commit_message>
able to use keyboard in standard calculator
</commit_message>
<xml_diff>
--- a/Calculator & Converter.pptx
+++ b/Calculator & Converter.pptx
@@ -27933,7 +27933,7 @@
         </p:nvSpPr>
         <p:spPr>
           <a:xfrm>
-            <a:off x="3462800" y="3837169"/>
+            <a:off x="3348499" y="3835517"/>
             <a:ext cx="5681200" cy="574800"/>
           </a:xfrm>
           <a:prstGeom prst="rect">
@@ -27957,7 +27957,7 @@
             </a:pPr>
             <a:r>
               <a:rPr lang="en" dirty="0"/>
-              <a:t>&lt; Người dùng phải đăng kí để dùng được những tính năng hay ho &gt;</a:t>
+              <a:t>&lt; Vì sản phẩm này ko responsive và sẽ rất bất tiện nếu dùng ở các thiết bị nhỏ &gt;</a:t>
             </a:r>
             <a:endParaRPr dirty="0"/>
           </a:p>
@@ -27975,7 +27975,7 @@
         </p:nvSpPr>
         <p:spPr>
           <a:xfrm>
-            <a:off x="3070299" y="2854250"/>
+            <a:off x="3070299" y="2976309"/>
             <a:ext cx="6073693" cy="574800"/>
           </a:xfrm>
           <a:prstGeom prst="rect">
@@ -27999,7 +27999,7 @@
             </a:pPr>
             <a:r>
               <a:rPr lang="en" dirty="0"/>
-              <a:t>&lt; Vì khóa 2 học về API mà sản phẩm của em vẫn chưa có API nên em muốn có 1 tính năng gì đó có cần API&gt;</a:t>
+              <a:t>&lt; Để cho những người dùng trang web bằng máy tính sử dụng tiện lợi hơn &gt;</a:t>
             </a:r>
             <a:endParaRPr dirty="0"/>
           </a:p>
@@ -28017,8 +28017,8 @@
         </p:nvSpPr>
         <p:spPr>
           <a:xfrm>
-            <a:off x="3070300" y="2546325"/>
-            <a:ext cx="5010300" cy="338400"/>
+            <a:off x="3070299" y="2546325"/>
+            <a:ext cx="6004999" cy="338400"/>
           </a:xfrm>
           <a:prstGeom prst="rect">
             <a:avLst/>
@@ -28041,49 +28041,7 @@
             </a:pPr>
             <a:r>
               <a:rPr lang="en" dirty="0"/>
-              <a:t>Tính năng gì đó cần API</a:t>
-            </a:r>
-            <a:endParaRPr dirty="0"/>
-          </a:p>
-        </p:txBody>
-      </p:sp>
-      <p:sp>
-        <p:nvSpPr>
-          <p:cNvPr id="664" name="Google Shape;664;p35"/>
-          <p:cNvSpPr txBox="1">
-            <a:spLocks noGrp="1"/>
-          </p:cNvSpPr>
-          <p:nvPr>
-            <p:ph type="subTitle" idx="4"/>
-          </p:nvPr>
-        </p:nvSpPr>
-        <p:spPr>
-          <a:xfrm>
-            <a:off x="2643774" y="1871350"/>
-            <a:ext cx="6385925" cy="574800"/>
-          </a:xfrm>
-          <a:prstGeom prst="rect">
-            <a:avLst/>
-          </a:prstGeom>
-        </p:spPr>
-        <p:txBody>
-          <a:bodyPr spcFirstLastPara="1" wrap="square" lIns="91425" tIns="91425" rIns="91425" bIns="91425" anchor="ctr" anchorCtr="0">
-            <a:noAutofit/>
-          </a:bodyPr>
-          <a:lstStyle/>
-          <a:p>
-            <a:pPr marL="0" lvl="0" indent="0" algn="l" rtl="0">
-              <a:spcBef>
-                <a:spcPts val="0"/>
-              </a:spcBef>
-              <a:spcAft>
-                <a:spcPts val="0"/>
-              </a:spcAft>
-              <a:buNone/>
-            </a:pPr>
-            <a:r>
-              <a:rPr lang="en" dirty="0"/>
-              <a:t>&lt; Người dùng có thể tạo ra 1 bộ chuyển đổi của riêng mình &gt;</a:t>
+              <a:t>Có thể dùng bàn phím để nhập số, phép tính</a:t>
             </a:r>
             <a:endParaRPr dirty="0"/>
           </a:p>
@@ -28101,7 +28059,7 @@
         </p:nvSpPr>
         <p:spPr>
           <a:xfrm>
-            <a:off x="2643774" y="1563425"/>
+            <a:off x="2643774" y="1832844"/>
             <a:ext cx="5604875" cy="338400"/>
           </a:xfrm>
           <a:prstGeom prst="rect">
@@ -28125,7 +28083,7 @@
             </a:pPr>
             <a:r>
               <a:rPr lang="en" dirty="0"/>
-              <a:t>Tạo 1 cái converter của riêng mình</a:t>
+              <a:t>Fix các lỗi</a:t>
             </a:r>
             <a:endParaRPr dirty="0"/>
           </a:p>
@@ -28143,8 +28101,8 @@
         </p:nvSpPr>
         <p:spPr>
           <a:xfrm>
-            <a:off x="3462800" y="3529250"/>
-            <a:ext cx="5010300" cy="338400"/>
+            <a:off x="3259679" y="3539260"/>
+            <a:ext cx="6431517" cy="338400"/>
           </a:xfrm>
           <a:prstGeom prst="rect">
             <a:avLst/>
@@ -28166,12 +28124,44 @@
               <a:buNone/>
             </a:pPr>
             <a:r>
+              <a:rPr lang="en-US" dirty="0" err="1"/>
+              <a:t>Khiến</a:t>
+            </a:r>
+            <a:r>
               <a:rPr lang="en-US" dirty="0"/>
-              <a:t>Đ</a:t>
-            </a:r>
-            <a:r>
-              <a:rPr lang="en" dirty="0"/>
-              <a:t>ăng nhập/ đăng kí</a:t>
+              <a:t> </a:t>
+            </a:r>
+            <a:r>
+              <a:rPr lang="en-US" dirty="0" err="1"/>
+              <a:t>trang</a:t>
+            </a:r>
+            <a:r>
+              <a:rPr lang="en-US" dirty="0"/>
+              <a:t> web </a:t>
+            </a:r>
+            <a:r>
+              <a:rPr lang="en-US" dirty="0" err="1"/>
+              <a:t>này</a:t>
+            </a:r>
+            <a:r>
+              <a:rPr lang="en-US" dirty="0"/>
+              <a:t> </a:t>
+            </a:r>
+            <a:r>
+              <a:rPr lang="en-US" dirty="0" err="1"/>
+              <a:t>trở</a:t>
+            </a:r>
+            <a:r>
+              <a:rPr lang="en-US" dirty="0"/>
+              <a:t> </a:t>
+            </a:r>
+            <a:r>
+              <a:rPr lang="en-US" dirty="0" err="1"/>
+              <a:t>nên</a:t>
+            </a:r>
+            <a:r>
+              <a:rPr lang="en-US" dirty="0"/>
+              <a:t> responsive</a:t>
             </a:r>
             <a:endParaRPr dirty="0"/>
           </a:p>
@@ -30105,7 +30095,7 @@
         </p:nvGrpSpPr>
         <p:grpSpPr>
           <a:xfrm>
-            <a:off x="2750054" y="3787724"/>
+            <a:off x="2570325" y="3750649"/>
             <a:ext cx="365767" cy="365751"/>
             <a:chOff x="4596788" y="1356600"/>
             <a:chExt cx="315725" cy="315575"/>
@@ -30871,7 +30861,7 @@
         </p:nvGrpSpPr>
         <p:grpSpPr>
           <a:xfrm>
-            <a:off x="2643775" y="3726850"/>
+            <a:off x="2464046" y="3689775"/>
             <a:ext cx="578325" cy="487500"/>
             <a:chOff x="4764875" y="1706700"/>
             <a:chExt cx="578325" cy="487500"/>
@@ -31188,49 +31178,6 @@
                                   </p:childTnLst>
                                 </p:cTn>
                               </p:par>
-                              <p:par>
-                                <p:cTn id="8" presetID="10" presetClass="entr" presetSubtype="0" fill="hold" grpId="0" nodeType="withEffect">
-                                  <p:stCondLst>
-                                    <p:cond delay="0"/>
-                                  </p:stCondLst>
-                                  <p:childTnLst>
-                                    <p:set>
-                                      <p:cBhvr>
-                                        <p:cTn id="9" dur="1" fill="hold">
-                                          <p:stCondLst>
-                                            <p:cond delay="0"/>
-                                          </p:stCondLst>
-                                        </p:cTn>
-                                        <p:tgtEl>
-                                          <p:spTgt spid="664">
-                                            <p:txEl>
-                                              <p:pRg st="0" end="0"/>
-                                            </p:txEl>
-                                          </p:spTgt>
-                                        </p:tgtEl>
-                                        <p:attrNameLst>
-                                          <p:attrName>style.visibility</p:attrName>
-                                        </p:attrNameLst>
-                                      </p:cBhvr>
-                                      <p:to>
-                                        <p:strVal val="visible"/>
-                                      </p:to>
-                                    </p:set>
-                                    <p:animEffect transition="in" filter="fade">
-                                      <p:cBhvr>
-                                        <p:cTn id="10" dur="500"/>
-                                        <p:tgtEl>
-                                          <p:spTgt spid="664">
-                                            <p:txEl>
-                                              <p:pRg st="0" end="0"/>
-                                            </p:txEl>
-                                          </p:spTgt>
-                                        </p:tgtEl>
-                                      </p:cBhvr>
-                                    </p:animEffect>
-                                  </p:childTnLst>
-                                </p:cTn>
-                              </p:par>
                             </p:childTnLst>
                           </p:cTn>
                         </p:par>
@@ -31238,26 +31185,26 @@
                     </p:cTn>
                   </p:par>
                   <p:par>
-                    <p:cTn id="11" fill="hold">
+                    <p:cTn id="8" fill="hold">
                       <p:stCondLst>
                         <p:cond delay="indefinite"/>
                       </p:stCondLst>
                       <p:childTnLst>
                         <p:par>
-                          <p:cTn id="12" fill="hold">
+                          <p:cTn id="9" fill="hold">
                             <p:stCondLst>
                               <p:cond delay="0"/>
                             </p:stCondLst>
                             <p:childTnLst>
                               <p:par>
-                                <p:cTn id="13" presetID="10" presetClass="entr" presetSubtype="0" fill="hold" grpId="0" nodeType="clickEffect">
+                                <p:cTn id="10" presetID="10" presetClass="entr" presetSubtype="0" fill="hold" grpId="0" nodeType="clickEffect">
                                   <p:stCondLst>
                                     <p:cond delay="0"/>
                                   </p:stCondLst>
                                   <p:childTnLst>
                                     <p:set>
                                       <p:cBhvr>
-                                        <p:cTn id="14" dur="1" fill="hold">
+                                        <p:cTn id="11" dur="1" fill="hold">
                                           <p:stCondLst>
                                             <p:cond delay="0"/>
                                           </p:stCondLst>
@@ -31279,7 +31226,7 @@
                                     </p:set>
                                     <p:animEffect transition="in" filter="fade">
                                       <p:cBhvr>
-                                        <p:cTn id="15" dur="500"/>
+                                        <p:cTn id="12" dur="500"/>
                                         <p:tgtEl>
                                           <p:spTgt spid="663">
                                             <p:txEl>
@@ -31293,14 +31240,14 @@
                                 </p:cTn>
                               </p:par>
                               <p:par>
-                                <p:cTn id="16" presetID="10" presetClass="entr" presetSubtype="0" fill="hold" grpId="0" nodeType="withEffect">
+                                <p:cTn id="13" presetID="10" presetClass="entr" presetSubtype="0" fill="hold" grpId="0" nodeType="withEffect">
                                   <p:stCondLst>
                                     <p:cond delay="0"/>
                                   </p:stCondLst>
                                   <p:childTnLst>
                                     <p:set>
                                       <p:cBhvr>
-                                        <p:cTn id="17" dur="1" fill="hold">
+                                        <p:cTn id="14" dur="1" fill="hold">
                                           <p:stCondLst>
                                             <p:cond delay="0"/>
                                           </p:stCondLst>
@@ -31322,7 +31269,7 @@
                                     </p:set>
                                     <p:animEffect transition="in" filter="fade">
                                       <p:cBhvr>
-                                        <p:cTn id="18" dur="500"/>
+                                        <p:cTn id="15" dur="500"/>
                                         <p:tgtEl>
                                           <p:spTgt spid="662">
                                             <p:txEl>
@@ -31342,26 +31289,26 @@
                     </p:cTn>
                   </p:par>
                   <p:par>
-                    <p:cTn id="19" fill="hold">
+                    <p:cTn id="16" fill="hold">
                       <p:stCondLst>
                         <p:cond delay="indefinite"/>
                       </p:stCondLst>
                       <p:childTnLst>
                         <p:par>
-                          <p:cTn id="20" fill="hold">
+                          <p:cTn id="17" fill="hold">
                             <p:stCondLst>
                               <p:cond delay="0"/>
                             </p:stCondLst>
                             <p:childTnLst>
                               <p:par>
-                                <p:cTn id="21" presetID="10" presetClass="entr" presetSubtype="0" fill="hold" grpId="0" nodeType="clickEffect">
+                                <p:cTn id="18" presetID="10" presetClass="entr" presetSubtype="0" fill="hold" grpId="0" nodeType="clickEffect">
                                   <p:stCondLst>
                                     <p:cond delay="0"/>
                                   </p:stCondLst>
                                   <p:childTnLst>
                                     <p:set>
                                       <p:cBhvr>
-                                        <p:cTn id="22" dur="1" fill="hold">
+                                        <p:cTn id="19" dur="1" fill="hold">
                                           <p:stCondLst>
                                             <p:cond delay="0"/>
                                           </p:stCondLst>
@@ -31383,7 +31330,7 @@
                                     </p:set>
                                     <p:animEffect transition="in" filter="fade">
                                       <p:cBhvr>
-                                        <p:cTn id="23" dur="500"/>
+                                        <p:cTn id="20" dur="500"/>
                                         <p:tgtEl>
                                           <p:spTgt spid="666">
                                             <p:txEl>
@@ -31397,14 +31344,14 @@
                                 </p:cTn>
                               </p:par>
                               <p:par>
-                                <p:cTn id="24" presetID="10" presetClass="entr" presetSubtype="0" fill="hold" grpId="0" nodeType="withEffect">
+                                <p:cTn id="21" presetID="10" presetClass="entr" presetSubtype="0" fill="hold" grpId="0" nodeType="withEffect">
                                   <p:stCondLst>
                                     <p:cond delay="0"/>
                                   </p:stCondLst>
                                   <p:childTnLst>
                                     <p:set>
                                       <p:cBhvr>
-                                        <p:cTn id="25" dur="1" fill="hold">
+                                        <p:cTn id="22" dur="1" fill="hold">
                                           <p:stCondLst>
                                             <p:cond delay="0"/>
                                           </p:stCondLst>
@@ -31426,7 +31373,7 @@
                                     </p:set>
                                     <p:animEffect transition="in" filter="fade">
                                       <p:cBhvr>
-                                        <p:cTn id="26" dur="500"/>
+                                        <p:cTn id="23" dur="500"/>
                                         <p:tgtEl>
                                           <p:spTgt spid="661">
                                             <p:txEl>
@@ -31470,7 +31417,6 @@
       <p:bldP spid="661" grpId="0" build="p"/>
       <p:bldP spid="662" grpId="0" build="p"/>
       <p:bldP spid="663" grpId="0" build="p"/>
-      <p:bldP spid="664" grpId="0" build="p"/>
       <p:bldP spid="665" grpId="0" build="p"/>
       <p:bldP spid="666" grpId="0" build="p"/>
     </p:bldLst>

</xml_diff>